<commit_message>
Einstellungen als Professor hinzugefügt
</commit_message>
<xml_diff>
--- a/Dokumente/Coaching/2016-11-09 Präsentation Technologiemanager.pptx
+++ b/Dokumente/Coaching/2016-11-09 Präsentation Technologiemanager.pptx
@@ -4676,7 +4676,7 @@
             </a:pPr>
             <a:r>
               <a:rPr lang="de-DE" dirty="0"/>
-              <a:t>Smartphones und Tablets auf denen Android 4.4 oder höher läuft</a:t>
+              <a:t>Smartphones (auch lauffähig auf Tablets) auf denen Android 4.4 oder höher läuft</a:t>
             </a:r>
           </a:p>
           <a:p>
@@ -4719,17 +4719,7 @@
             </a:pPr>
             <a:r>
               <a:rPr lang="de-DE" dirty="0"/>
-              <a:t>Apache als Webserver für Admin-Interface</a:t>
-            </a:r>
-          </a:p>
-          <a:p>
-            <a:pPr marL="342900" indent="-342900">
-              <a:buFont typeface="Arial" panose="020B0604020202020204" pitchFamily="34" charset="0"/>
-              <a:buChar char="•"/>
-            </a:pPr>
-            <a:r>
-              <a:rPr lang="de-DE" dirty="0"/>
-              <a:t>Betriebssystem: eine Linux-Distribution, wahrscheinlich Debian</a:t>
+              <a:t>Betriebssystem: Linux-Distribution</a:t>
             </a:r>
           </a:p>
         </p:txBody>
@@ -4919,6 +4909,50 @@
             </a:r>
           </a:p>
           <a:p>
+            <a:endParaRPr lang="de-DE" dirty="0"/>
+          </a:p>
+          <a:p>
+            <a:pPr marL="342900" indent="-342900">
+              <a:buFont typeface="Arial" panose="020B0604020202020204" pitchFamily="34" charset="0"/>
+              <a:buChar char="•"/>
+            </a:pPr>
+            <a:r>
+              <a:rPr lang="de-DE" dirty="0" err="1"/>
+              <a:t>Eclipse</a:t>
+            </a:r>
+            <a:r>
+              <a:rPr lang="de-DE" dirty="0"/>
+              <a:t> oder </a:t>
+            </a:r>
+            <a:r>
+              <a:rPr lang="de-DE" dirty="0" err="1"/>
+              <a:t>IntelliJ</a:t>
+            </a:r>
+            <a:r>
+              <a:rPr lang="de-DE" dirty="0"/>
+              <a:t> als Entwicklungsumgebung für Server</a:t>
+            </a:r>
+          </a:p>
+          <a:p>
+            <a:pPr marL="342900" indent="-342900">
+              <a:buFont typeface="Arial" panose="020B0604020202020204" pitchFamily="34" charset="0"/>
+              <a:buChar char="•"/>
+            </a:pPr>
+            <a:r>
+              <a:rPr lang="de-DE" dirty="0" err="1"/>
+              <a:t>Maven</a:t>
+            </a:r>
+            <a:r>
+              <a:rPr lang="de-DE" dirty="0"/>
+              <a:t> als </a:t>
+            </a:r>
+            <a:r>
+              <a:rPr lang="de-DE" dirty="0" err="1"/>
+              <a:t>Buildmanager</a:t>
+            </a:r>
+            <a:endParaRPr lang="de-DE" dirty="0"/>
+          </a:p>
+          <a:p>
             <a:pPr marL="342900" indent="-342900">
               <a:buFont typeface="Arial" panose="020B0604020202020204" pitchFamily="34" charset="0"/>
               <a:buChar char="•"/>
@@ -4932,20 +4966,17 @@
             </a:pPr>
             <a:r>
               <a:rPr lang="de-DE" dirty="0" err="1"/>
-              <a:t>Eclipse</a:t>
+              <a:t>Codesharing</a:t>
             </a:r>
             <a:r>
               <a:rPr lang="de-DE" dirty="0"/>
-              <a:t> oder </a:t>
+              <a:t> über </a:t>
             </a:r>
             <a:r>
               <a:rPr lang="de-DE" dirty="0" err="1"/>
-              <a:t>IntelliJ</a:t>
-            </a:r>
-            <a:r>
-              <a:rPr lang="de-DE" dirty="0"/>
-              <a:t> als Entwicklungsumgebung für Server</a:t>
-            </a:r>
+              <a:t>GitHub</a:t>
+            </a:r>
+            <a:endParaRPr lang="de-DE" dirty="0"/>
           </a:p>
           <a:p>
             <a:pPr marL="342900" indent="-342900">
@@ -5062,8 +5093,13 @@
             </a:pPr>
             <a:r>
               <a:rPr lang="de-DE" sz="2000" dirty="0"/>
-              <a:t>REST-Service</a:t>
-            </a:r>
+              <a:t>REST-Service über Jersey und </a:t>
+            </a:r>
+            <a:r>
+              <a:rPr lang="de-DE" sz="2000" dirty="0" err="1"/>
+              <a:t>Grizzly</a:t>
+            </a:r>
+            <a:endParaRPr lang="de-DE" sz="2000" dirty="0"/>
           </a:p>
           <a:p>
             <a:pPr marL="342900" indent="-342900">
@@ -5071,8 +5107,12 @@
               <a:buChar char="•"/>
             </a:pPr>
             <a:r>
+              <a:rPr lang="de-DE" sz="2000" dirty="0" err="1"/>
+              <a:t>SQLite</a:t>
+            </a:r>
+            <a:r>
               <a:rPr lang="de-DE" sz="2000" dirty="0"/>
-              <a:t>MySQL Datenbank</a:t>
+              <a:t> Datenbank</a:t>
             </a:r>
           </a:p>
           <a:p>

</xml_diff>

<commit_message>
TG: Kontrolle der Präsentation
</commit_message>
<xml_diff>
--- a/Dokumente/Coaching/2016-11-09 Präsentation Technologiemanager.pptx
+++ b/Dokumente/Coaching/2016-11-09 Präsentation Technologiemanager.pptx
@@ -1016,6 +1016,236 @@
 </file>
 
 <file path=ppt/notesSlides/notesSlide2.xml><?xml version="1.0" encoding="utf-8"?>
+<p:notes xmlns:a="http://schemas.openxmlformats.org/drawingml/2006/main" xmlns:r="http://schemas.openxmlformats.org/officeDocument/2006/relationships" xmlns:p="http://schemas.openxmlformats.org/presentationml/2006/main">
+  <p:cSld>
+    <p:spTree>
+      <p:nvGrpSpPr>
+        <p:cNvPr id="1" name=""/>
+        <p:cNvGrpSpPr/>
+        <p:nvPr/>
+      </p:nvGrpSpPr>
+      <p:grpSpPr>
+        <a:xfrm>
+          <a:off x="0" y="0"/>
+          <a:ext cx="0" cy="0"/>
+          <a:chOff x="0" y="0"/>
+          <a:chExt cx="0" cy="0"/>
+        </a:xfrm>
+      </p:grpSpPr>
+      <p:sp>
+        <p:nvSpPr>
+          <p:cNvPr id="2" name="Folienbildplatzhalter 1"/>
+          <p:cNvSpPr>
+            <a:spLocks noGrp="1" noRot="1" noChangeAspect="1"/>
+          </p:cNvSpPr>
+          <p:nvPr>
+            <p:ph type="sldImg"/>
+          </p:nvPr>
+        </p:nvSpPr>
+        <p:spPr>
+          <a:xfrm>
+            <a:off x="917575" y="744538"/>
+            <a:ext cx="4962525" cy="3722687"/>
+          </a:xfrm>
+        </p:spPr>
+      </p:sp>
+      <p:sp>
+        <p:nvSpPr>
+          <p:cNvPr id="3" name="Notizenplatzhalter 2"/>
+          <p:cNvSpPr>
+            <a:spLocks noGrp="1"/>
+          </p:cNvSpPr>
+          <p:nvPr>
+            <p:ph type="body" idx="1"/>
+          </p:nvPr>
+        </p:nvSpPr>
+        <p:spPr/>
+        <p:txBody>
+          <a:bodyPr/>
+          <a:lstStyle/>
+          <a:p>
+            <a:r>
+              <a:rPr lang="de-DE" dirty="0" smtClean="0"/>
+              <a:t>REST ist</a:t>
+            </a:r>
+            <a:r>
+              <a:rPr lang="de-DE" baseline="0" dirty="0" smtClean="0"/>
+              <a:t> ein gängiger Standard. Das Admin </a:t>
+            </a:r>
+            <a:r>
+              <a:rPr lang="de-DE" baseline="0" dirty="0" err="1" smtClean="0"/>
+              <a:t>interface</a:t>
+            </a:r>
+            <a:r>
+              <a:rPr lang="de-DE" baseline="0" dirty="0" smtClean="0"/>
+              <a:t>, welches eine einfache HTML-Form sein soll, kann ganz einfach an den Rest </a:t>
+            </a:r>
+            <a:r>
+              <a:rPr lang="de-DE" baseline="0" smtClean="0"/>
+              <a:t>angebunden werden </a:t>
+            </a:r>
+            <a:r>
+              <a:rPr lang="de-DE" baseline="0" dirty="0" smtClean="0"/>
+              <a:t/>
+            </a:r>
+            <a:br>
+              <a:rPr lang="de-DE" baseline="0" dirty="0" smtClean="0"/>
+            </a:br>
+            <a:r>
+              <a:rPr lang="de-DE" baseline="0" dirty="0" smtClean="0"/>
+              <a:t>JSON ebenfalls</a:t>
+            </a:r>
+          </a:p>
+          <a:p>
+            <a:r>
+              <a:rPr lang="de-DE" baseline="0" dirty="0" smtClean="0"/>
+              <a:t/>
+            </a:r>
+            <a:br>
+              <a:rPr lang="de-DE" baseline="0" dirty="0" smtClean="0"/>
+            </a:br>
+            <a:r>
+              <a:rPr lang="de-DE" baseline="0" dirty="0" err="1" smtClean="0"/>
+              <a:t>SQLite</a:t>
+            </a:r>
+            <a:r>
+              <a:rPr lang="de-DE" baseline="0" dirty="0" smtClean="0"/>
+              <a:t> macht unsere Umgebung portabel. Einfach für Entwickler </a:t>
+            </a:r>
+          </a:p>
+          <a:p>
+            <a:endParaRPr lang="de-DE" dirty="0"/>
+          </a:p>
+        </p:txBody>
+      </p:sp>
+      <p:sp>
+        <p:nvSpPr>
+          <p:cNvPr id="4" name="Foliennummernplatzhalter 3"/>
+          <p:cNvSpPr>
+            <a:spLocks noGrp="1"/>
+          </p:cNvSpPr>
+          <p:nvPr>
+            <p:ph type="sldNum" sz="quarter" idx="10"/>
+          </p:nvPr>
+        </p:nvSpPr>
+        <p:spPr/>
+        <p:txBody>
+          <a:bodyPr/>
+          <a:lstStyle/>
+          <a:p>
+            <a:fld id="{19E14FFE-E01B-461A-8D8E-D91C17AFA971}" type="slidenum">
+              <a:rPr lang="de-DE" altLang="de-DE" smtClean="0"/>
+              <a:pPr/>
+              <a:t>11</a:t>
+            </a:fld>
+            <a:endParaRPr lang="de-DE" altLang="de-DE"/>
+          </a:p>
+        </p:txBody>
+      </p:sp>
+    </p:spTree>
+    <p:extLst>
+      <p:ext uri="{BB962C8B-B14F-4D97-AF65-F5344CB8AC3E}">
+        <p14:creationId xmlns:p14="http://schemas.microsoft.com/office/powerpoint/2010/main" val="3151514341"/>
+      </p:ext>
+    </p:extLst>
+  </p:cSld>
+  <p:clrMapOvr>
+    <a:masterClrMapping/>
+  </p:clrMapOvr>
+</p:notes>
+</file>
+
+<file path=ppt/notesSlides/notesSlide3.xml><?xml version="1.0" encoding="utf-8"?>
+<p:notes xmlns:a="http://schemas.openxmlformats.org/drawingml/2006/main" xmlns:r="http://schemas.openxmlformats.org/officeDocument/2006/relationships" xmlns:p="http://schemas.openxmlformats.org/presentationml/2006/main">
+  <p:cSld>
+    <p:spTree>
+      <p:nvGrpSpPr>
+        <p:cNvPr id="1" name=""/>
+        <p:cNvGrpSpPr/>
+        <p:nvPr/>
+      </p:nvGrpSpPr>
+      <p:grpSpPr>
+        <a:xfrm>
+          <a:off x="0" y="0"/>
+          <a:ext cx="0" cy="0"/>
+          <a:chOff x="0" y="0"/>
+          <a:chExt cx="0" cy="0"/>
+        </a:xfrm>
+      </p:grpSpPr>
+      <p:sp>
+        <p:nvSpPr>
+          <p:cNvPr id="2" name="Folienbildplatzhalter 1"/>
+          <p:cNvSpPr>
+            <a:spLocks noGrp="1" noRot="1" noChangeAspect="1"/>
+          </p:cNvSpPr>
+          <p:nvPr>
+            <p:ph type="sldImg"/>
+          </p:nvPr>
+        </p:nvSpPr>
+        <p:spPr>
+          <a:xfrm>
+            <a:off x="917575" y="744538"/>
+            <a:ext cx="4962525" cy="3722687"/>
+          </a:xfrm>
+        </p:spPr>
+      </p:sp>
+      <p:sp>
+        <p:nvSpPr>
+          <p:cNvPr id="3" name="Notizenplatzhalter 2"/>
+          <p:cNvSpPr>
+            <a:spLocks noGrp="1"/>
+          </p:cNvSpPr>
+          <p:nvPr>
+            <p:ph type="body" idx="1"/>
+          </p:nvPr>
+        </p:nvSpPr>
+        <p:spPr/>
+        <p:txBody>
+          <a:bodyPr/>
+          <a:lstStyle/>
+          <a:p>
+            <a:endParaRPr lang="de-DE" dirty="0"/>
+          </a:p>
+        </p:txBody>
+      </p:sp>
+      <p:sp>
+        <p:nvSpPr>
+          <p:cNvPr id="4" name="Foliennummernplatzhalter 3"/>
+          <p:cNvSpPr>
+            <a:spLocks noGrp="1"/>
+          </p:cNvSpPr>
+          <p:nvPr>
+            <p:ph type="sldNum" sz="quarter" idx="10"/>
+          </p:nvPr>
+        </p:nvSpPr>
+        <p:spPr/>
+        <p:txBody>
+          <a:bodyPr/>
+          <a:lstStyle/>
+          <a:p>
+            <a:fld id="{19E14FFE-E01B-461A-8D8E-D91C17AFA971}" type="slidenum">
+              <a:rPr lang="de-DE" altLang="de-DE" smtClean="0"/>
+              <a:pPr/>
+              <a:t>12</a:t>
+            </a:fld>
+            <a:endParaRPr lang="de-DE" altLang="de-DE"/>
+          </a:p>
+        </p:txBody>
+      </p:sp>
+    </p:spTree>
+    <p:extLst>
+      <p:ext uri="{BB962C8B-B14F-4D97-AF65-F5344CB8AC3E}">
+        <p14:creationId xmlns:p14="http://schemas.microsoft.com/office/powerpoint/2010/main" val="3827549865"/>
+      </p:ext>
+    </p:extLst>
+  </p:cSld>
+  <p:clrMapOvr>
+    <a:masterClrMapping/>
+  </p:clrMapOvr>
+</p:notes>
+</file>
+
+<file path=ppt/notesSlides/notesSlide4.xml><?xml version="1.0" encoding="utf-8"?>
 <p:notes xmlns:a="http://schemas.openxmlformats.org/drawingml/2006/main" xmlns:r="http://schemas.openxmlformats.org/officeDocument/2006/relationships" xmlns:p="http://schemas.openxmlformats.org/presentationml/2006/main">
   <p:cSld>
     <p:spTree>
@@ -4112,6 +4342,10 @@
               <a:rPr lang="de-DE" altLang="de-DE" sz="3200" dirty="0"/>
               <a:t>“ Projekt SWE</a:t>
             </a:r>
+            <a:r>
+              <a:rPr lang="de-DE" altLang="de-DE" dirty="0"/>
+              <a:t/>
+            </a:r>
             <a:br>
               <a:rPr lang="de-DE" altLang="de-DE" dirty="0"/>
             </a:br>
@@ -4446,15 +4680,7 @@
             </a:pPr>
             <a:r>
               <a:rPr lang="de-DE" sz="2000" dirty="0"/>
-              <a:t>Viele </a:t>
-            </a:r>
-            <a:r>
-              <a:rPr lang="de-DE" sz="2000"/>
-              <a:t>frei verfügbaren </a:t>
-            </a:r>
-            <a:r>
-              <a:rPr lang="de-DE" sz="2000" dirty="0"/>
-              <a:t>Bibliotheken für unseren Anwendungsfall</a:t>
+              <a:t>Viele frei verfügbaren Bibliotheken für unseren Anwendungsfall</a:t>
             </a:r>
           </a:p>
           <a:p>
@@ -4588,7 +4814,11 @@
             </a:pPr>
             <a:r>
               <a:rPr lang="de-DE" sz="1800" dirty="0"/>
-              <a:t>Vielen aus anderen Fächern (GPM) bekannt</a:t>
+              <a:t>Vielen aus anderen Fächern (GPM) </a:t>
+            </a:r>
+            <a:r>
+              <a:rPr lang="de-DE" sz="1800" dirty="0" smtClean="0"/>
+              <a:t>bekannt</a:t>
             </a:r>
           </a:p>
           <a:p>
@@ -4596,6 +4826,17 @@
               <a:buFont typeface="Arial" panose="020B0604020202020204" pitchFamily="34" charset="0"/>
               <a:buChar char="•"/>
             </a:pPr>
+            <a:r>
+              <a:rPr lang="de-DE" sz="1800" dirty="0" smtClean="0"/>
+              <a:t>REST-Service</a:t>
+            </a:r>
+            <a:endParaRPr lang="de-DE" sz="1800" dirty="0"/>
+          </a:p>
+          <a:p>
+            <a:pPr marL="285750" indent="-285750">
+              <a:buFont typeface="Arial" panose="020B0604020202020204" pitchFamily="34" charset="0"/>
+              <a:buChar char="•"/>
+            </a:pPr>
             <a:endParaRPr lang="de-DE" sz="1800" dirty="0"/>
           </a:p>
           <a:p>
@@ -4659,8 +4900,31 @@
             </a:pPr>
             <a:r>
               <a:rPr lang="de-DE" sz="1800" dirty="0"/>
-              <a:t>SQL ist bekannt</a:t>
-            </a:r>
+              <a:t>SQL ist </a:t>
+            </a:r>
+            <a:r>
+              <a:rPr lang="de-DE" sz="1800" dirty="0" smtClean="0"/>
+              <a:t>bekannt</a:t>
+            </a:r>
+          </a:p>
+          <a:p>
+            <a:pPr marL="342900" indent="-342900">
+              <a:buFont typeface="Arial" panose="020B0604020202020204" pitchFamily="34" charset="0"/>
+              <a:buChar char="•"/>
+            </a:pPr>
+            <a:r>
+              <a:rPr lang="de-DE" sz="1800" dirty="0" smtClean="0"/>
+              <a:t>Einfache </a:t>
+            </a:r>
+            <a:r>
+              <a:rPr lang="de-DE" sz="1800" dirty="0"/>
+              <a:t>I</a:t>
+            </a:r>
+            <a:r>
+              <a:rPr lang="de-DE" sz="1800" dirty="0" smtClean="0"/>
+              <a:t>mplementierung, da kein dedizierter Server notwendig</a:t>
+            </a:r>
+            <a:endParaRPr lang="de-DE" sz="1800" dirty="0"/>
           </a:p>
           <a:p>
             <a:pPr marL="342900" indent="-342900">
@@ -5066,6 +5330,10 @@
             <a:br>
               <a:rPr lang="de-DE" altLang="de-DE" dirty="0"/>
             </a:br>
+            <a:r>
+              <a:rPr lang="de-DE" altLang="de-DE" dirty="0"/>
+              <a:t/>
+            </a:r>
             <a:br>
               <a:rPr lang="de-DE" altLang="de-DE" dirty="0"/>
             </a:br>
@@ -5608,7 +5876,15 @@
             </a:pPr>
             <a:r>
               <a:rPr lang="de-DE" dirty="0"/>
-              <a:t>Smartphones (auch lauffähig auf Tablets) auf denen Android 4.4 oder höher läuft</a:t>
+              <a:t>Smartphones (auch </a:t>
+            </a:r>
+            <a:r>
+              <a:rPr lang="de-DE" b="1" u="sng" dirty="0"/>
+              <a:t>lauffähig</a:t>
+            </a:r>
+            <a:r>
+              <a:rPr lang="de-DE" dirty="0"/>
+              <a:t> auf Tablets) auf denen Android 4.4 oder höher läuft</a:t>
             </a:r>
           </a:p>
           <a:p>
@@ -5618,8 +5894,17 @@
             </a:pPr>
             <a:r>
               <a:rPr lang="de-DE" dirty="0"/>
-              <a:t>Kamera ist Pflicht</a:t>
-            </a:r>
+              <a:t>Kamera </a:t>
+            </a:r>
+            <a:r>
+              <a:rPr lang="de-DE" dirty="0" smtClean="0"/>
+              <a:t>zwingend </a:t>
+            </a:r>
+            <a:r>
+              <a:rPr lang="de-DE" dirty="0" err="1" smtClean="0"/>
+              <a:t>erfolderlich</a:t>
+            </a:r>
+            <a:endParaRPr lang="de-DE" dirty="0"/>
           </a:p>
           <a:p>
             <a:pPr marL="342900" indent="-342900">
@@ -5640,9 +5925,10 @@
               <a:buChar char="•"/>
             </a:pPr>
             <a:r>
-              <a:rPr lang="de-DE" dirty="0"/>
-              <a:t>Java-fähig</a:t>
-            </a:r>
+              <a:rPr lang="de-DE" dirty="0" smtClean="0"/>
+              <a:t>Java-Applikation</a:t>
+            </a:r>
+            <a:endParaRPr lang="de-DE" dirty="0"/>
           </a:p>
           <a:p>
             <a:pPr marL="342900" indent="-342900">
@@ -5651,8 +5937,13 @@
             </a:pPr>
             <a:r>
               <a:rPr lang="de-DE" dirty="0"/>
-              <a:t>Betriebssystem: Linux-Distribution</a:t>
-            </a:r>
+              <a:t>Betriebssystem: </a:t>
+            </a:r>
+            <a:r>
+              <a:rPr lang="de-DE" dirty="0" smtClean="0"/>
+              <a:t>JAVA-Laufzeitumgebung</a:t>
+            </a:r>
+            <a:endParaRPr lang="de-DE" dirty="0"/>
           </a:p>
         </p:txBody>
       </p:sp>
@@ -5862,26 +6153,15 @@
             </a:r>
             <a:r>
               <a:rPr lang="de-DE" dirty="0"/>
-              <a:t> als Entwicklungsumgebung für Server</a:t>
-            </a:r>
-          </a:p>
-          <a:p>
-            <a:pPr marL="342900" indent="-342900">
-              <a:buFont typeface="Arial" panose="020B0604020202020204" pitchFamily="34" charset="0"/>
-              <a:buChar char="•"/>
-            </a:pPr>
-            <a:r>
-              <a:rPr lang="de-DE" dirty="0" err="1"/>
-              <a:t>Maven</a:t>
-            </a:r>
-            <a:r>
-              <a:rPr lang="de-DE" dirty="0"/>
-              <a:t> als </a:t>
-            </a:r>
-            <a:r>
-              <a:rPr lang="de-DE" dirty="0" err="1"/>
-              <a:t>Buildmanager</a:t>
-            </a:r>
+              <a:t> als Entwicklungsumgebung für </a:t>
+            </a:r>
+            <a:r>
+              <a:rPr lang="de-DE" dirty="0" smtClean="0"/>
+              <a:t>Server</a:t>
+            </a:r>
+            <a:br>
+              <a:rPr lang="de-DE" dirty="0" smtClean="0"/>
+            </a:br>
             <a:endParaRPr lang="de-DE" dirty="0"/>
           </a:p>
           <a:p>
@@ -6044,16 +6324,47 @@
             </a:r>
             <a:r>
               <a:rPr lang="de-DE" sz="2000" dirty="0"/>
-              <a:t> Datenbank</a:t>
-            </a:r>
-          </a:p>
-          <a:p>
-            <a:endParaRPr lang="de-DE" dirty="0"/>
-          </a:p>
-          <a:p>
+              <a:t> </a:t>
+            </a:r>
+            <a:r>
+              <a:rPr lang="de-DE" sz="2000" dirty="0" smtClean="0"/>
+              <a:t>Datenbank</a:t>
+            </a:r>
+          </a:p>
+          <a:p>
+            <a:pPr marL="342900" indent="-342900">
+              <a:buFont typeface="Arial" panose="020B0604020202020204" pitchFamily="34" charset="0"/>
+              <a:buChar char="•"/>
+            </a:pPr>
+            <a:r>
+              <a:rPr lang="de-DE" sz="2000" dirty="0" err="1"/>
+              <a:t>Maven</a:t>
+            </a:r>
+            <a:r>
+              <a:rPr lang="de-DE" sz="2000" dirty="0"/>
+              <a:t> als </a:t>
+            </a:r>
+            <a:r>
+              <a:rPr lang="de-DE" sz="2000" dirty="0" err="1"/>
+              <a:t>Buildmanager</a:t>
+            </a:r>
+            <a:endParaRPr lang="de-DE" sz="2000" dirty="0"/>
+          </a:p>
+          <a:p>
+            <a:pPr marL="342900" indent="-342900">
+              <a:buFont typeface="Arial" panose="020B0604020202020204" pitchFamily="34" charset="0"/>
+              <a:buChar char="•"/>
+            </a:pPr>
+            <a:endParaRPr lang="de-DE" sz="2000" dirty="0"/>
+          </a:p>
+          <a:p>
+            <a:r>
+              <a:rPr lang="de-DE" dirty="0" smtClean="0"/>
+              <a:t>Client</a:t>
+            </a:r>
             <a:r>
               <a:rPr lang="de-DE" dirty="0"/>
-              <a:t>Client:</a:t>
+              <a:t>:</a:t>
             </a:r>
           </a:p>
           <a:p>
@@ -6245,7 +6556,15 @@
             </a:r>
             <a:r>
               <a:rPr lang="de-DE" dirty="0"/>
-              <a:t>: Google GSON</a:t>
+              <a:t>: </a:t>
+            </a:r>
+            <a:r>
+              <a:rPr lang="de-DE" dirty="0" smtClean="0"/>
+              <a:t>Google </a:t>
+            </a:r>
+            <a:r>
+              <a:rPr lang="de-DE" dirty="0"/>
+              <a:t>GSON</a:t>
             </a:r>
           </a:p>
         </p:txBody>

</xml_diff>